<commit_message>
Update ipynb name, update ppt, update pdf, readme
</commit_message>
<xml_diff>
--- a/LendingClubCaseStudy_EDA.pptx
+++ b/LendingClubCaseStudy_EDA.pptx
@@ -14051,19 +14051,7 @@
               <a:rPr lang="en-US" sz="1500" b="0" i="0" dirty="0">
                 <a:effectLst/>
               </a:rPr>
-              <a:t>-Interest rates are increments in </a:t>
-            </a:r>
-            <a:r>
-              <a:rPr lang="en-US" sz="1500" b="0" i="0" dirty="0" err="1">
-                <a:effectLst/>
-              </a:rPr>
-              <a:t>propotion</a:t>
-            </a:r>
-            <a:r>
-              <a:rPr lang="en-US" sz="1500" b="0" i="0" dirty="0">
-                <a:effectLst/>
-              </a:rPr>
-              <a:t> to growth of grades in ascending order</a:t>
+              <a:t>-Interest rates are increments in proportion to growth of grades in ascending order</a:t>
             </a:r>
             <a:endParaRPr lang="en-US" sz="1500" dirty="0"/>
           </a:p>
@@ -17948,6 +17936,14 @@
 <file path=ppt/slides/slide23.xml><?xml version="1.0" encoding="utf-8"?>
 <p:sld xmlns:a="http://schemas.openxmlformats.org/drawingml/2006/main" xmlns:r="http://schemas.openxmlformats.org/officeDocument/2006/relationships" xmlns:p="http://schemas.openxmlformats.org/presentationml/2006/main">
   <p:cSld>
+    <p:bg>
+      <p:bgPr>
+        <a:solidFill>
+          <a:schemeClr val="bg1"/>
+        </a:solidFill>
+        <a:effectLst/>
+      </p:bgPr>
+    </p:bg>
     <p:spTree>
       <p:nvGrpSpPr>
         <p:cNvPr id="1" name=""/>
@@ -17978,16 +17974,283 @@
             <p:ph type="title"/>
           </p:nvPr>
         </p:nvSpPr>
-        <p:spPr/>
+        <p:spPr>
+          <a:xfrm>
+            <a:off x="8079978" y="741391"/>
+            <a:ext cx="3369234" cy="1616203"/>
+          </a:xfrm>
+        </p:spPr>
         <p:txBody>
-          <a:bodyPr/>
+          <a:bodyPr anchor="b">
+            <a:normAutofit/>
+          </a:bodyPr>
           <a:lstStyle/>
           <a:p>
             <a:r>
-              <a:rPr lang="en-US" dirty="0"/>
+              <a:rPr lang="en-US" sz="3200"/>
               <a:t>Conclusion</a:t>
             </a:r>
-            <a:endParaRPr lang="en-IN" dirty="0"/>
+            <a:endParaRPr lang="en-IN" sz="3200"/>
+          </a:p>
+        </p:txBody>
+      </p:sp>
+      <p:pic>
+        <p:nvPicPr>
+          <p:cNvPr id="5" name="Picture 4" descr="Magnifying glass showing decling performance">
+            <a:extLst>
+              <a:ext uri="{FF2B5EF4-FFF2-40B4-BE49-F238E27FC236}">
+                <a16:creationId xmlns:a16="http://schemas.microsoft.com/office/drawing/2014/main" id="{A1D4B441-437D-D444-322E-C23303E1A015}"/>
+              </a:ext>
+            </a:extLst>
+          </p:cNvPr>
+          <p:cNvPicPr>
+            <a:picLocks noChangeAspect="1"/>
+          </p:cNvPicPr>
+          <p:nvPr/>
+        </p:nvPicPr>
+        <p:blipFill rotWithShape="1">
+          <a:blip r:embed="rId2"/>
+          <a:srcRect r="28068" b="-1"/>
+          <a:stretch/>
+        </p:blipFill>
+        <p:spPr>
+          <a:xfrm>
+            <a:off x="20" y="10"/>
+            <a:ext cx="7390243" cy="6857990"/>
+          </a:xfrm>
+          <a:prstGeom prst="rect">
+            <a:avLst/>
+          </a:prstGeom>
+        </p:spPr>
+      </p:pic>
+      <p:sp>
+        <p:nvSpPr>
+          <p:cNvPr id="9" name="Rectangle 8">
+            <a:extLst>
+              <a:ext uri="{FF2B5EF4-FFF2-40B4-BE49-F238E27FC236}">
+                <a16:creationId xmlns:a16="http://schemas.microsoft.com/office/drawing/2014/main" id="{AE3A741D-C19B-960A-5803-1C5887147820}"/>
+              </a:ext>
+              <a:ext uri="{C183D7F6-B498-43B3-948B-1728B52AA6E4}">
+                <adec:decorative xmlns:adec="http://schemas.microsoft.com/office/drawing/2017/decorative" val="1"/>
+              </a:ext>
+            </a:extLst>
+          </p:cNvPr>
+          <p:cNvSpPr>
+            <a:spLocks noGrp="1" noRot="1" noChangeAspect="1" noMove="1" noResize="1" noEditPoints="1" noAdjustHandles="1" noChangeArrowheads="1" noChangeShapeType="1" noTextEdit="1"/>
+          </p:cNvSpPr>
+          <p:nvPr>
+            <p:extLst>
+              <p:ext uri="{386F3935-93C4-4BCD-93E2-E3B085C9AB24}">
+                <p16:designElem xmlns:p16="http://schemas.microsoft.com/office/powerpoint/2015/main" val="1"/>
+              </p:ext>
+            </p:extLst>
+          </p:nvPr>
+        </p:nvSpPr>
+        <p:spPr>
+          <a:xfrm rot="5400000">
+            <a:off x="2879677" y="2347416"/>
+            <a:ext cx="1630908" cy="7390262"/>
+          </a:xfrm>
+          <a:prstGeom prst="rect">
+            <a:avLst/>
+          </a:prstGeom>
+          <a:gradFill>
+            <a:gsLst>
+              <a:gs pos="0">
+                <a:schemeClr val="accent5"/>
+              </a:gs>
+              <a:gs pos="47000">
+                <a:schemeClr val="accent2">
+                  <a:alpha val="0"/>
+                </a:schemeClr>
+              </a:gs>
+            </a:gsLst>
+            <a:lin ang="11400000" scaled="0"/>
+          </a:gradFill>
+          <a:ln>
+            <a:noFill/>
+          </a:ln>
+        </p:spPr>
+        <p:style>
+          <a:lnRef idx="2">
+            <a:schemeClr val="accent1">
+              <a:shade val="50000"/>
+            </a:schemeClr>
+          </a:lnRef>
+          <a:fillRef idx="1">
+            <a:schemeClr val="accent1"/>
+          </a:fillRef>
+          <a:effectRef idx="0">
+            <a:schemeClr val="accent1"/>
+          </a:effectRef>
+          <a:fontRef idx="minor">
+            <a:schemeClr val="lt1"/>
+          </a:fontRef>
+        </p:style>
+        <p:txBody>
+          <a:bodyPr rtlCol="0" anchor="ctr"/>
+          <a:lstStyle/>
+          <a:p>
+            <a:pPr algn="ctr"/>
+            <a:endParaRPr lang="en-US"/>
+          </a:p>
+        </p:txBody>
+      </p:sp>
+      <p:sp>
+        <p:nvSpPr>
+          <p:cNvPr id="11" name="Rectangle 10">
+            <a:extLst>
+              <a:ext uri="{FF2B5EF4-FFF2-40B4-BE49-F238E27FC236}">
+                <a16:creationId xmlns:a16="http://schemas.microsoft.com/office/drawing/2014/main" id="{DC39DE25-0E4E-0AA7-0932-1D78C2372786}"/>
+              </a:ext>
+              <a:ext uri="{C183D7F6-B498-43B3-948B-1728B52AA6E4}">
+                <adec:decorative xmlns:adec="http://schemas.microsoft.com/office/drawing/2017/decorative" val="1"/>
+              </a:ext>
+            </a:extLst>
+          </p:cNvPr>
+          <p:cNvSpPr>
+            <a:spLocks noGrp="1" noRot="1" noChangeAspect="1" noMove="1" noResize="1" noEditPoints="1" noAdjustHandles="1" noChangeArrowheads="1" noChangeShapeType="1" noTextEdit="1"/>
+          </p:cNvSpPr>
+          <p:nvPr>
+            <p:extLst>
+              <p:ext uri="{386F3935-93C4-4BCD-93E2-E3B085C9AB24}">
+                <p16:designElem xmlns:p16="http://schemas.microsoft.com/office/powerpoint/2015/main" val="1"/>
+              </p:ext>
+            </p:extLst>
+          </p:nvPr>
+        </p:nvSpPr>
+        <p:spPr>
+          <a:xfrm rot="5400000" flipH="1" flipV="1">
+            <a:off x="-1919061" y="1919060"/>
+            <a:ext cx="6854280" cy="3016159"/>
+          </a:xfrm>
+          <a:prstGeom prst="rect">
+            <a:avLst/>
+          </a:prstGeom>
+          <a:gradFill flip="none" rotWithShape="1">
+            <a:gsLst>
+              <a:gs pos="0">
+                <a:schemeClr val="accent5"/>
+              </a:gs>
+              <a:gs pos="47000">
+                <a:schemeClr val="accent2">
+                  <a:alpha val="0"/>
+                </a:schemeClr>
+              </a:gs>
+            </a:gsLst>
+            <a:lin ang="4200000" scaled="0"/>
+            <a:tileRect/>
+          </a:gradFill>
+          <a:ln w="12700" cap="flat" cmpd="sng" algn="ctr">
+            <a:noFill/>
+            <a:prstDash val="solid"/>
+            <a:miter lim="800000"/>
+          </a:ln>
+          <a:effectLst/>
+        </p:spPr>
+        <p:style>
+          <a:lnRef idx="2">
+            <a:schemeClr val="accent1">
+              <a:shade val="50000"/>
+            </a:schemeClr>
+          </a:lnRef>
+          <a:fillRef idx="1">
+            <a:schemeClr val="accent1"/>
+          </a:fillRef>
+          <a:effectRef idx="0">
+            <a:schemeClr val="accent1"/>
+          </a:effectRef>
+          <a:fontRef idx="minor">
+            <a:schemeClr val="lt1"/>
+          </a:fontRef>
+        </p:style>
+        <p:txBody>
+          <a:bodyPr rtlCol="0" anchor="ctr"/>
+          <a:lstStyle/>
+          <a:p>
+            <a:pPr algn="r"/>
+            <a:endParaRPr lang="en-US"/>
+          </a:p>
+        </p:txBody>
+      </p:sp>
+      <p:sp>
+        <p:nvSpPr>
+          <p:cNvPr id="13" name="Rectangle 12">
+            <a:extLst>
+              <a:ext uri="{FF2B5EF4-FFF2-40B4-BE49-F238E27FC236}">
+                <a16:creationId xmlns:a16="http://schemas.microsoft.com/office/drawing/2014/main" id="{8D6EA299-0840-6DEA-E670-C49AEBC87E89}"/>
+              </a:ext>
+              <a:ext uri="{C183D7F6-B498-43B3-948B-1728B52AA6E4}">
+                <adec:decorative xmlns:adec="http://schemas.microsoft.com/office/drawing/2017/decorative" val="1"/>
+              </a:ext>
+            </a:extLst>
+          </p:cNvPr>
+          <p:cNvSpPr>
+            <a:spLocks noGrp="1" noRot="1" noChangeAspect="1" noMove="1" noResize="1" noEditPoints="1" noAdjustHandles="1" noChangeArrowheads="1" noChangeShapeType="1" noTextEdit="1"/>
+          </p:cNvSpPr>
+          <p:nvPr>
+            <p:extLst>
+              <p:ext uri="{386F3935-93C4-4BCD-93E2-E3B085C9AB24}">
+                <p16:designElem xmlns:p16="http://schemas.microsoft.com/office/powerpoint/2015/main" val="1"/>
+              </p:ext>
+            </p:extLst>
+          </p:nvPr>
+        </p:nvSpPr>
+        <p:spPr>
+          <a:xfrm rot="10800000">
+            <a:off x="4461657" y="4425055"/>
+            <a:ext cx="2928605" cy="2432945"/>
+          </a:xfrm>
+          <a:prstGeom prst="rect">
+            <a:avLst/>
+          </a:prstGeom>
+          <a:gradFill flip="none" rotWithShape="1">
+            <a:gsLst>
+              <a:gs pos="0">
+                <a:schemeClr val="accent2"/>
+              </a:gs>
+              <a:gs pos="51000">
+                <a:schemeClr val="accent5">
+                  <a:lumMod val="60000"/>
+                  <a:lumOff val="40000"/>
+                  <a:alpha val="0"/>
+                </a:schemeClr>
+              </a:gs>
+            </a:gsLst>
+            <a:path path="circle">
+              <a:fillToRect r="100000" b="100000"/>
+            </a:path>
+            <a:tileRect l="-100000" t="-100000"/>
+          </a:gradFill>
+          <a:ln w="12700" cap="flat" cmpd="sng" algn="ctr">
+            <a:noFill/>
+            <a:prstDash val="solid"/>
+            <a:miter lim="800000"/>
+          </a:ln>
+          <a:effectLst/>
+        </p:spPr>
+        <p:style>
+          <a:lnRef idx="2">
+            <a:schemeClr val="accent1">
+              <a:shade val="50000"/>
+            </a:schemeClr>
+          </a:lnRef>
+          <a:fillRef idx="1">
+            <a:schemeClr val="accent1"/>
+          </a:fillRef>
+          <a:effectRef idx="0">
+            <a:schemeClr val="accent1"/>
+          </a:effectRef>
+          <a:fontRef idx="minor">
+            <a:schemeClr val="lt1"/>
+          </a:fontRef>
+        </p:style>
+        <p:txBody>
+          <a:bodyPr rtlCol="0" anchor="ctr"/>
+          <a:lstStyle/>
+          <a:p>
+            <a:pPr algn="r"/>
+            <a:endParaRPr lang="en-US"/>
           </a:p>
         </p:txBody>
       </p:sp>
@@ -18007,12 +18270,41 @@
             <p:ph idx="1"/>
           </p:nvPr>
         </p:nvSpPr>
-        <p:spPr/>
+        <p:spPr>
+          <a:xfrm>
+            <a:off x="8079978" y="2533476"/>
+            <a:ext cx="3369234" cy="3447832"/>
+          </a:xfrm>
+        </p:spPr>
         <p:txBody>
-          <a:bodyPr/>
+          <a:bodyPr anchor="t">
+            <a:normAutofit/>
+          </a:bodyPr>
           <a:lstStyle/>
           <a:p>
-            <a:endParaRPr lang="en-IN" dirty="0"/>
+            <a:r>
+              <a:rPr lang="en-US" sz="1900"/>
+              <a:t>People with employment length more than 10 years or less than 1 year are likely to default</a:t>
+            </a:r>
+          </a:p>
+          <a:p>
+            <a:r>
+              <a:rPr lang="en-US" sz="1900"/>
+              <a:t> Lower income group(up to 20000) is likely to default.</a:t>
+            </a:r>
+          </a:p>
+          <a:p>
+            <a:r>
+              <a:rPr lang="en-US" sz="1900"/>
+              <a:t>Small business loan are likely to default</a:t>
+            </a:r>
+          </a:p>
+          <a:p>
+            <a:r>
+              <a:rPr lang="en-US" sz="1900"/>
+              <a:t>People with public reported bankrupticies are highly likely to default</a:t>
+            </a:r>
+            <a:endParaRPr lang="en-IN" sz="1900"/>
           </a:p>
         </p:txBody>
       </p:sp>

</xml_diff>